<commit_message>
added blank slide to divide extras
</commit_message>
<xml_diff>
--- a/IntroToWebTechnology/introToWeb.pptx
+++ b/IntroToWebTechnology/introToWeb.pptx
@@ -5,7 +5,7 @@
     <p:sldMasterId id="2147483660" r:id="rId1"/>
   </p:sldMasterIdLst>
   <p:notesMasterIdLst>
-    <p:notesMasterId r:id="rId19"/>
+    <p:notesMasterId r:id="rId20"/>
   </p:notesMasterIdLst>
   <p:sldIdLst>
     <p:sldId id="256" r:id="rId2"/>
@@ -21,10 +21,11 @@
     <p:sldId id="266" r:id="rId12"/>
     <p:sldId id="268" r:id="rId13"/>
     <p:sldId id="273" r:id="rId14"/>
-    <p:sldId id="267" r:id="rId15"/>
-    <p:sldId id="270" r:id="rId16"/>
-    <p:sldId id="271" r:id="rId17"/>
-    <p:sldId id="274" r:id="rId18"/>
+    <p:sldId id="281" r:id="rId15"/>
+    <p:sldId id="267" r:id="rId16"/>
+    <p:sldId id="270" r:id="rId17"/>
+    <p:sldId id="271" r:id="rId18"/>
+    <p:sldId id="274" r:id="rId19"/>
   </p:sldIdLst>
   <p:sldSz cx="12192000" cy="6858000"/>
   <p:notesSz cx="6858000" cy="9144000"/>
@@ -213,7 +214,7 @@
           <a:p>
             <a:fld id="{7C28A56C-B7DC-4B0B-A28E-64830014DEAF}" type="datetimeFigureOut">
               <a:rPr lang="en-US" smtClean="0"/>
-              <a:t>8/19/19</a:t>
+              <a:t>8/26/19</a:t>
             </a:fld>
             <a:endParaRPr lang="en-US"/>
           </a:p>
@@ -1467,7 +1468,7 @@
           <a:p>
             <a:fld id="{B417B79C-9BEE-4788-8A40-105E29A8A87D}" type="datetimeFigureOut">
               <a:rPr lang="en-US" smtClean="0"/>
-              <a:t>8/19/19</a:t>
+              <a:t>8/26/19</a:t>
             </a:fld>
             <a:endParaRPr lang="en-US"/>
           </a:p>
@@ -1645,7 +1646,7 @@
           <a:p>
             <a:fld id="{B417B79C-9BEE-4788-8A40-105E29A8A87D}" type="datetimeFigureOut">
               <a:rPr lang="en-US" smtClean="0"/>
-              <a:t>8/19/19</a:t>
+              <a:t>8/26/19</a:t>
             </a:fld>
             <a:endParaRPr lang="en-US"/>
           </a:p>
@@ -1833,7 +1834,7 @@
           <a:p>
             <a:fld id="{B417B79C-9BEE-4788-8A40-105E29A8A87D}" type="datetimeFigureOut">
               <a:rPr lang="en-US" smtClean="0"/>
-              <a:t>8/19/19</a:t>
+              <a:t>8/26/19</a:t>
             </a:fld>
             <a:endParaRPr lang="en-US"/>
           </a:p>
@@ -2011,7 +2012,7 @@
           <a:p>
             <a:fld id="{B417B79C-9BEE-4788-8A40-105E29A8A87D}" type="datetimeFigureOut">
               <a:rPr lang="en-US" smtClean="0"/>
-              <a:t>8/19/19</a:t>
+              <a:t>8/26/19</a:t>
             </a:fld>
             <a:endParaRPr lang="en-US"/>
           </a:p>
@@ -2265,7 +2266,7 @@
           <a:p>
             <a:fld id="{B417B79C-9BEE-4788-8A40-105E29A8A87D}" type="datetimeFigureOut">
               <a:rPr lang="en-US" smtClean="0"/>
-              <a:t>8/19/19</a:t>
+              <a:t>8/26/19</a:t>
             </a:fld>
             <a:endParaRPr lang="en-US"/>
           </a:p>
@@ -2505,7 +2506,7 @@
           <a:p>
             <a:fld id="{B417B79C-9BEE-4788-8A40-105E29A8A87D}" type="datetimeFigureOut">
               <a:rPr lang="en-US" smtClean="0"/>
-              <a:t>8/19/19</a:t>
+              <a:t>8/26/19</a:t>
             </a:fld>
             <a:endParaRPr lang="en-US"/>
           </a:p>
@@ -2880,7 +2881,7 @@
           <a:p>
             <a:fld id="{B417B79C-9BEE-4788-8A40-105E29A8A87D}" type="datetimeFigureOut">
               <a:rPr lang="en-US" smtClean="0"/>
-              <a:t>8/19/19</a:t>
+              <a:t>8/26/19</a:t>
             </a:fld>
             <a:endParaRPr lang="en-US"/>
           </a:p>
@@ -3006,7 +3007,7 @@
           <a:p>
             <a:fld id="{B417B79C-9BEE-4788-8A40-105E29A8A87D}" type="datetimeFigureOut">
               <a:rPr lang="en-US" smtClean="0"/>
-              <a:t>8/19/19</a:t>
+              <a:t>8/26/19</a:t>
             </a:fld>
             <a:endParaRPr lang="en-US"/>
           </a:p>
@@ -3109,7 +3110,7 @@
           <a:p>
             <a:fld id="{B417B79C-9BEE-4788-8A40-105E29A8A87D}" type="datetimeFigureOut">
               <a:rPr lang="en-US" smtClean="0"/>
-              <a:t>8/19/19</a:t>
+              <a:t>8/26/19</a:t>
             </a:fld>
             <a:endParaRPr lang="en-US"/>
           </a:p>
@@ -3394,7 +3395,7 @@
           <a:p>
             <a:fld id="{B417B79C-9BEE-4788-8A40-105E29A8A87D}" type="datetimeFigureOut">
               <a:rPr lang="en-US" smtClean="0"/>
-              <a:t>8/19/19</a:t>
+              <a:t>8/26/19</a:t>
             </a:fld>
             <a:endParaRPr lang="en-US"/>
           </a:p>
@@ -3659,7 +3660,7 @@
           <a:p>
             <a:fld id="{B417B79C-9BEE-4788-8A40-105E29A8A87D}" type="datetimeFigureOut">
               <a:rPr lang="en-US" smtClean="0"/>
-              <a:t>8/19/19</a:t>
+              <a:t>8/26/19</a:t>
             </a:fld>
             <a:endParaRPr lang="en-US"/>
           </a:p>
@@ -3875,7 +3876,7 @@
           <a:p>
             <a:fld id="{B417B79C-9BEE-4788-8A40-105E29A8A87D}" type="datetimeFigureOut">
               <a:rPr lang="en-US" smtClean="0"/>
-              <a:t>8/19/19</a:t>
+              <a:t>8/26/19</a:t>
             </a:fld>
             <a:endParaRPr lang="en-US"/>
           </a:p>
@@ -4859,7 +4860,13 @@
       </p:grpSpPr>
       <p:sp>
         <p:nvSpPr>
-          <p:cNvPr id="2" name="Title 1"/>
+          <p:cNvPr id="2" name="Title 1">
+            <a:extLst>
+              <a:ext uri="{FF2B5EF4-FFF2-40B4-BE49-F238E27FC236}">
+                <a16:creationId xmlns:a16="http://schemas.microsoft.com/office/drawing/2014/main" id="{62648974-F73C-834C-8225-2FEA9E8CA652}"/>
+              </a:ext>
+            </a:extLst>
+          </p:cNvPr>
           <p:cNvSpPr>
             <a:spLocks noGrp="1"/>
           </p:cNvSpPr>
@@ -4872,16 +4879,19 @@
           <a:bodyPr/>
           <a:lstStyle/>
           <a:p>
-            <a:r>
-              <a:rPr lang="en-US" dirty="0"/>
-              <a:t>Scraping Basics</a:t>
-            </a:r>
-          </a:p>
-        </p:txBody>
-      </p:sp>
-      <p:sp>
-        <p:nvSpPr>
-          <p:cNvPr id="3" name="Content Placeholder 2"/>
+            <a:endParaRPr lang="en-US"/>
+          </a:p>
+        </p:txBody>
+      </p:sp>
+      <p:sp>
+        <p:nvSpPr>
+          <p:cNvPr id="3" name="Content Placeholder 2">
+            <a:extLst>
+              <a:ext uri="{FF2B5EF4-FFF2-40B4-BE49-F238E27FC236}">
+                <a16:creationId xmlns:a16="http://schemas.microsoft.com/office/drawing/2014/main" id="{69079D73-158C-8042-8E56-8525909478C9}"/>
+              </a:ext>
+            </a:extLst>
+          </p:cNvPr>
           <p:cNvSpPr>
             <a:spLocks noGrp="1"/>
           </p:cNvSpPr>
@@ -4894,45 +4904,14 @@
           <a:bodyPr/>
           <a:lstStyle/>
           <a:p>
-            <a:r>
-              <a:rPr lang="en-US" dirty="0"/>
-              <a:t>Showing how easy it is to “extract” html data</a:t>
-            </a:r>
-          </a:p>
-          <a:p>
-            <a:r>
-              <a:rPr lang="en-US" dirty="0"/>
-              <a:t>Showing how easy it is to “extract” </a:t>
-            </a:r>
-            <a:r>
-              <a:rPr lang="en-US" dirty="0" err="1"/>
-              <a:t>css</a:t>
-            </a:r>
-            <a:r>
-              <a:rPr lang="en-US" dirty="0"/>
-              <a:t> data</a:t>
-            </a:r>
-          </a:p>
-          <a:p>
-            <a:r>
-              <a:rPr lang="en-US" dirty="0"/>
-              <a:t>Show how to manipulate </a:t>
-            </a:r>
-            <a:r>
-              <a:rPr lang="en-US" dirty="0" err="1"/>
-              <a:t>css</a:t>
-            </a:r>
-            <a:r>
-              <a:rPr lang="en-US" dirty="0"/>
-              <a:t> or html directly through the DOM</a:t>
-            </a:r>
+            <a:endParaRPr lang="en-US"/>
           </a:p>
         </p:txBody>
       </p:sp>
     </p:spTree>
     <p:extLst>
       <p:ext uri="{BB962C8B-B14F-4D97-AF65-F5344CB8AC3E}">
-        <p14:creationId xmlns:p14="http://schemas.microsoft.com/office/powerpoint/2010/main" val="3448334027"/>
+        <p14:creationId xmlns:p14="http://schemas.microsoft.com/office/powerpoint/2010/main" val="980923055"/>
       </p:ext>
     </p:extLst>
   </p:cSld>
@@ -4976,7 +4955,7 @@
           <a:p>
             <a:r>
               <a:rPr lang="en-US" dirty="0"/>
-              <a:t>Explain the DOM and Console: your best friends</a:t>
+              <a:t>Scraping Basics</a:t>
             </a:r>
           </a:p>
         </p:txBody>
@@ -4998,19 +4977,35 @@
           <a:p>
             <a:r>
               <a:rPr lang="en-US" dirty="0"/>
-              <a:t>Show the inspection properties for an element and talk about what that means</a:t>
+              <a:t>Showing how easy it is to “extract” html data</a:t>
             </a:r>
           </a:p>
           <a:p>
             <a:r>
               <a:rPr lang="en-US" dirty="0"/>
-              <a:t>Show where the console is</a:t>
-            </a:r>
-          </a:p>
-          <a:p>
+              <a:t>Showing how easy it is to “extract” </a:t>
+            </a:r>
+            <a:r>
+              <a:rPr lang="en-US" dirty="0" err="1"/>
+              <a:t>css</a:t>
+            </a:r>
             <a:r>
               <a:rPr lang="en-US" dirty="0"/>
-              <a:t>Type a few things into the console</a:t>
+              <a:t> data</a:t>
+            </a:r>
+          </a:p>
+          <a:p>
+            <a:r>
+              <a:rPr lang="en-US" dirty="0"/>
+              <a:t>Show how to manipulate </a:t>
+            </a:r>
+            <a:r>
+              <a:rPr lang="en-US" dirty="0" err="1"/>
+              <a:t>css</a:t>
+            </a:r>
+            <a:r>
+              <a:rPr lang="en-US" dirty="0"/>
+              <a:t> or html directly through the DOM</a:t>
             </a:r>
           </a:p>
         </p:txBody>
@@ -5018,7 +5013,7 @@
     </p:spTree>
     <p:extLst>
       <p:ext uri="{BB962C8B-B14F-4D97-AF65-F5344CB8AC3E}">
-        <p14:creationId xmlns:p14="http://schemas.microsoft.com/office/powerpoint/2010/main" val="528912967"/>
+        <p14:creationId xmlns:p14="http://schemas.microsoft.com/office/powerpoint/2010/main" val="3448334027"/>
       </p:ext>
     </p:extLst>
   </p:cSld>
@@ -5062,6 +5057,92 @@
           <a:p>
             <a:r>
               <a:rPr lang="en-US" dirty="0"/>
+              <a:t>Explain the DOM and Console: your best friends</a:t>
+            </a:r>
+          </a:p>
+        </p:txBody>
+      </p:sp>
+      <p:sp>
+        <p:nvSpPr>
+          <p:cNvPr id="3" name="Content Placeholder 2"/>
+          <p:cNvSpPr>
+            <a:spLocks noGrp="1"/>
+          </p:cNvSpPr>
+          <p:nvPr>
+            <p:ph idx="1"/>
+          </p:nvPr>
+        </p:nvSpPr>
+        <p:spPr/>
+        <p:txBody>
+          <a:bodyPr/>
+          <a:lstStyle/>
+          <a:p>
+            <a:r>
+              <a:rPr lang="en-US" dirty="0"/>
+              <a:t>Show the inspection properties for an element and talk about what that means</a:t>
+            </a:r>
+          </a:p>
+          <a:p>
+            <a:r>
+              <a:rPr lang="en-US" dirty="0"/>
+              <a:t>Show where the console is</a:t>
+            </a:r>
+          </a:p>
+          <a:p>
+            <a:r>
+              <a:rPr lang="en-US" dirty="0"/>
+              <a:t>Type a few things into the console</a:t>
+            </a:r>
+          </a:p>
+        </p:txBody>
+      </p:sp>
+    </p:spTree>
+    <p:extLst>
+      <p:ext uri="{BB962C8B-B14F-4D97-AF65-F5344CB8AC3E}">
+        <p14:creationId xmlns:p14="http://schemas.microsoft.com/office/powerpoint/2010/main" val="528912967"/>
+      </p:ext>
+    </p:extLst>
+  </p:cSld>
+  <p:clrMapOvr>
+    <a:masterClrMapping/>
+  </p:clrMapOvr>
+</p:sld>
+</file>
+
+<file path=ppt/slides/slide17.xml><?xml version="1.0" encoding="utf-8"?>
+<p:sld xmlns:a="http://schemas.openxmlformats.org/drawingml/2006/main" xmlns:r="http://schemas.openxmlformats.org/officeDocument/2006/relationships" xmlns:p="http://schemas.openxmlformats.org/presentationml/2006/main">
+  <p:cSld>
+    <p:spTree>
+      <p:nvGrpSpPr>
+        <p:cNvPr id="1" name=""/>
+        <p:cNvGrpSpPr/>
+        <p:nvPr/>
+      </p:nvGrpSpPr>
+      <p:grpSpPr>
+        <a:xfrm>
+          <a:off x="0" y="0"/>
+          <a:ext cx="0" cy="0"/>
+          <a:chOff x="0" y="0"/>
+          <a:chExt cx="0" cy="0"/>
+        </a:xfrm>
+      </p:grpSpPr>
+      <p:sp>
+        <p:nvSpPr>
+          <p:cNvPr id="2" name="Title 1"/>
+          <p:cNvSpPr>
+            <a:spLocks noGrp="1"/>
+          </p:cNvSpPr>
+          <p:nvPr>
+            <p:ph type="title"/>
+          </p:nvPr>
+        </p:nvSpPr>
+        <p:spPr/>
+        <p:txBody>
+          <a:bodyPr/>
+          <a:lstStyle/>
+          <a:p>
+            <a:r>
+              <a:rPr lang="en-US" dirty="0"/>
               <a:t>JavaScript Basics</a:t>
             </a:r>
           </a:p>
@@ -5154,7 +5235,7 @@
 </p:sld>
 </file>
 
-<file path=ppt/slides/slide17.xml><?xml version="1.0" encoding="utf-8"?>
+<file path=ppt/slides/slide18.xml><?xml version="1.0" encoding="utf-8"?>
 <p:sld xmlns:a="http://schemas.openxmlformats.org/drawingml/2006/main" xmlns:r="http://schemas.openxmlformats.org/officeDocument/2006/relationships" xmlns:p="http://schemas.openxmlformats.org/presentationml/2006/main">
   <p:cSld>
     <p:spTree>

</xml_diff>

<commit_message>
increased size of bonus to challeng 1
</commit_message>
<xml_diff>
--- a/IntroToWebTechnology/introToWeb.pptx
+++ b/IntroToWebTechnology/introToWeb.pptx
@@ -214,7 +214,7 @@
           <a:p>
             <a:fld id="{7C28A56C-B7DC-4B0B-A28E-64830014DEAF}" type="datetimeFigureOut">
               <a:rPr lang="en-US" smtClean="0"/>
-              <a:t>8/26/19</a:t>
+              <a:t>9/8/20</a:t>
             </a:fld>
             <a:endParaRPr lang="en-US"/>
           </a:p>
@@ -1468,7 +1468,7 @@
           <a:p>
             <a:fld id="{B417B79C-9BEE-4788-8A40-105E29A8A87D}" type="datetimeFigureOut">
               <a:rPr lang="en-US" smtClean="0"/>
-              <a:t>8/26/19</a:t>
+              <a:t>9/8/20</a:t>
             </a:fld>
             <a:endParaRPr lang="en-US"/>
           </a:p>
@@ -1646,7 +1646,7 @@
           <a:p>
             <a:fld id="{B417B79C-9BEE-4788-8A40-105E29A8A87D}" type="datetimeFigureOut">
               <a:rPr lang="en-US" smtClean="0"/>
-              <a:t>8/26/19</a:t>
+              <a:t>9/8/20</a:t>
             </a:fld>
             <a:endParaRPr lang="en-US"/>
           </a:p>
@@ -1834,7 +1834,7 @@
           <a:p>
             <a:fld id="{B417B79C-9BEE-4788-8A40-105E29A8A87D}" type="datetimeFigureOut">
               <a:rPr lang="en-US" smtClean="0"/>
-              <a:t>8/26/19</a:t>
+              <a:t>9/8/20</a:t>
             </a:fld>
             <a:endParaRPr lang="en-US"/>
           </a:p>
@@ -2012,7 +2012,7 @@
           <a:p>
             <a:fld id="{B417B79C-9BEE-4788-8A40-105E29A8A87D}" type="datetimeFigureOut">
               <a:rPr lang="en-US" smtClean="0"/>
-              <a:t>8/26/19</a:t>
+              <a:t>9/8/20</a:t>
             </a:fld>
             <a:endParaRPr lang="en-US"/>
           </a:p>
@@ -2266,7 +2266,7 @@
           <a:p>
             <a:fld id="{B417B79C-9BEE-4788-8A40-105E29A8A87D}" type="datetimeFigureOut">
               <a:rPr lang="en-US" smtClean="0"/>
-              <a:t>8/26/19</a:t>
+              <a:t>9/8/20</a:t>
             </a:fld>
             <a:endParaRPr lang="en-US"/>
           </a:p>
@@ -2506,7 +2506,7 @@
           <a:p>
             <a:fld id="{B417B79C-9BEE-4788-8A40-105E29A8A87D}" type="datetimeFigureOut">
               <a:rPr lang="en-US" smtClean="0"/>
-              <a:t>8/26/19</a:t>
+              <a:t>9/8/20</a:t>
             </a:fld>
             <a:endParaRPr lang="en-US"/>
           </a:p>
@@ -2881,7 +2881,7 @@
           <a:p>
             <a:fld id="{B417B79C-9BEE-4788-8A40-105E29A8A87D}" type="datetimeFigureOut">
               <a:rPr lang="en-US" smtClean="0"/>
-              <a:t>8/26/19</a:t>
+              <a:t>9/8/20</a:t>
             </a:fld>
             <a:endParaRPr lang="en-US"/>
           </a:p>
@@ -3007,7 +3007,7 @@
           <a:p>
             <a:fld id="{B417B79C-9BEE-4788-8A40-105E29A8A87D}" type="datetimeFigureOut">
               <a:rPr lang="en-US" smtClean="0"/>
-              <a:t>8/26/19</a:t>
+              <a:t>9/8/20</a:t>
             </a:fld>
             <a:endParaRPr lang="en-US"/>
           </a:p>
@@ -3110,7 +3110,7 @@
           <a:p>
             <a:fld id="{B417B79C-9BEE-4788-8A40-105E29A8A87D}" type="datetimeFigureOut">
               <a:rPr lang="en-US" smtClean="0"/>
-              <a:t>8/26/19</a:t>
+              <a:t>9/8/20</a:t>
             </a:fld>
             <a:endParaRPr lang="en-US"/>
           </a:p>
@@ -3395,7 +3395,7 @@
           <a:p>
             <a:fld id="{B417B79C-9BEE-4788-8A40-105E29A8A87D}" type="datetimeFigureOut">
               <a:rPr lang="en-US" smtClean="0"/>
-              <a:t>8/26/19</a:t>
+              <a:t>9/8/20</a:t>
             </a:fld>
             <a:endParaRPr lang="en-US"/>
           </a:p>
@@ -3660,7 +3660,7 @@
           <a:p>
             <a:fld id="{B417B79C-9BEE-4788-8A40-105E29A8A87D}" type="datetimeFigureOut">
               <a:rPr lang="en-US" smtClean="0"/>
-              <a:t>8/26/19</a:t>
+              <a:t>9/8/20</a:t>
             </a:fld>
             <a:endParaRPr lang="en-US"/>
           </a:p>
@@ -3876,7 +3876,7 @@
           <a:p>
             <a:fld id="{B417B79C-9BEE-4788-8A40-105E29A8A87D}" type="datetimeFigureOut">
               <a:rPr lang="en-US" smtClean="0"/>
-              <a:t>8/26/19</a:t>
+              <a:t>9/8/20</a:t>
             </a:fld>
             <a:endParaRPr lang="en-US"/>
           </a:p>
@@ -4791,7 +4791,7 @@
             </a:r>
             <a:r>
               <a:rPr lang="en-US" dirty="0"/>
-              <a:t> size 500 and </a:t>
+              <a:t> size 1000 and </a:t>
             </a:r>
             <a:r>
               <a:rPr lang="en-US" i="1" dirty="0"/>
@@ -4799,7 +4799,7 @@
             </a:r>
             <a:r>
               <a:rPr lang="en-US" dirty="0"/>
-              <a:t>250 </a:t>
+              <a:t>500 </a:t>
             </a:r>
             <a:r>
               <a:rPr lang="en-US" i="1" dirty="0"/>

</xml_diff>